<commit_message>
staging content changes (-dave)
</commit_message>
<xml_diff>
--- a/pegasus/sites/virtual/curriculum-docs/csp/units-2016.pptx
+++ b/pegasus/sites/virtual/curriculum-docs/csp/units-2016.pptx
@@ -4,8 +4,11 @@
   <p:sldMasterIdLst>
     <p:sldMasterId id="2147483648" r:id="rId1"/>
   </p:sldMasterIdLst>
+  <p:notesMasterIdLst>
+    <p:notesMasterId r:id="rId3"/>
+  </p:notesMasterIdLst>
   <p:sldIdLst>
-    <p:sldId id="256" r:id="rId2"/>
+    <p:sldId id="259" r:id="rId2"/>
   </p:sldIdLst>
   <p:sldSz cx="12192000" cy="6858000"/>
   <p:notesSz cx="6858000" cy="9144000"/>
@@ -105,6 +108,356 @@
     </a:lvl9pPr>
   </p:defaultTextStyle>
 </p:presentation>
+</file>
+
+<file path=ppt/notesMasters/notesMaster1.xml><?xml version="1.0" encoding="utf-8"?>
+<p:notesMaster xmlns:a="http://schemas.openxmlformats.org/drawingml/2006/main" xmlns:r="http://schemas.openxmlformats.org/officeDocument/2006/relationships" xmlns:p="http://schemas.openxmlformats.org/presentationml/2006/main">
+  <p:cSld>
+    <p:bg>
+      <p:bgRef idx="1001">
+        <a:schemeClr val="bg1"/>
+      </p:bgRef>
+    </p:bg>
+    <p:spTree>
+      <p:nvGrpSpPr>
+        <p:cNvPr id="1" name=""/>
+        <p:cNvGrpSpPr/>
+        <p:nvPr/>
+      </p:nvGrpSpPr>
+      <p:grpSpPr>
+        <a:xfrm>
+          <a:off x="0" y="0"/>
+          <a:ext cx="0" cy="0"/>
+          <a:chOff x="0" y="0"/>
+          <a:chExt cx="0" cy="0"/>
+        </a:xfrm>
+      </p:grpSpPr>
+      <p:sp>
+        <p:nvSpPr>
+          <p:cNvPr id="2" name="Header Placeholder 1"/>
+          <p:cNvSpPr>
+            <a:spLocks noGrp="1"/>
+          </p:cNvSpPr>
+          <p:nvPr>
+            <p:ph type="hdr" sz="quarter"/>
+          </p:nvPr>
+        </p:nvSpPr>
+        <p:spPr>
+          <a:xfrm>
+            <a:off x="0" y="0"/>
+            <a:ext cx="2971800" cy="458788"/>
+          </a:xfrm>
+          <a:prstGeom prst="rect">
+            <a:avLst/>
+          </a:prstGeom>
+        </p:spPr>
+        <p:txBody>
+          <a:bodyPr vert="horz" lIns="91440" tIns="45720" rIns="91440" bIns="45720" rtlCol="0"/>
+          <a:lstStyle>
+            <a:lvl1pPr algn="l">
+              <a:defRPr sz="1200"/>
+            </a:lvl1pPr>
+          </a:lstStyle>
+          <a:p>
+            <a:endParaRPr lang="en-US"/>
+          </a:p>
+        </p:txBody>
+      </p:sp>
+      <p:sp>
+        <p:nvSpPr>
+          <p:cNvPr id="3" name="Date Placeholder 2"/>
+          <p:cNvSpPr>
+            <a:spLocks noGrp="1"/>
+          </p:cNvSpPr>
+          <p:nvPr>
+            <p:ph type="dt" idx="1"/>
+          </p:nvPr>
+        </p:nvSpPr>
+        <p:spPr>
+          <a:xfrm>
+            <a:off x="3884613" y="0"/>
+            <a:ext cx="2971800" cy="458788"/>
+          </a:xfrm>
+          <a:prstGeom prst="rect">
+            <a:avLst/>
+          </a:prstGeom>
+        </p:spPr>
+        <p:txBody>
+          <a:bodyPr vert="horz" lIns="91440" tIns="45720" rIns="91440" bIns="45720" rtlCol="0"/>
+          <a:lstStyle>
+            <a:lvl1pPr algn="r">
+              <a:defRPr sz="1200"/>
+            </a:lvl1pPr>
+          </a:lstStyle>
+          <a:p>
+            <a:fld id="{92290861-3FD5-3042-AA46-6708D0B98079}" type="datetimeFigureOut">
+              <a:rPr lang="en-US" smtClean="0"/>
+              <a:t>8/22/16</a:t>
+            </a:fld>
+            <a:endParaRPr lang="en-US"/>
+          </a:p>
+        </p:txBody>
+      </p:sp>
+      <p:sp>
+        <p:nvSpPr>
+          <p:cNvPr id="4" name="Slide Image Placeholder 3"/>
+          <p:cNvSpPr>
+            <a:spLocks noGrp="1" noRot="1" noChangeAspect="1"/>
+          </p:cNvSpPr>
+          <p:nvPr>
+            <p:ph type="sldImg" idx="2"/>
+          </p:nvPr>
+        </p:nvSpPr>
+        <p:spPr>
+          <a:xfrm>
+            <a:off x="685800" y="1143000"/>
+            <a:ext cx="5486400" cy="3086100"/>
+          </a:xfrm>
+          <a:prstGeom prst="rect">
+            <a:avLst/>
+          </a:prstGeom>
+          <a:noFill/>
+          <a:ln w="12700">
+            <a:solidFill>
+              <a:prstClr val="black"/>
+            </a:solidFill>
+          </a:ln>
+        </p:spPr>
+        <p:txBody>
+          <a:bodyPr vert="horz" lIns="91440" tIns="45720" rIns="91440" bIns="45720" rtlCol="0" anchor="ctr"/>
+          <a:lstStyle/>
+          <a:p>
+            <a:endParaRPr lang="en-US"/>
+          </a:p>
+        </p:txBody>
+      </p:sp>
+      <p:sp>
+        <p:nvSpPr>
+          <p:cNvPr id="5" name="Notes Placeholder 4"/>
+          <p:cNvSpPr>
+            <a:spLocks noGrp="1"/>
+          </p:cNvSpPr>
+          <p:nvPr>
+            <p:ph type="body" sz="quarter" idx="3"/>
+          </p:nvPr>
+        </p:nvSpPr>
+        <p:spPr>
+          <a:xfrm>
+            <a:off x="685800" y="4400550"/>
+            <a:ext cx="5486400" cy="3600450"/>
+          </a:xfrm>
+          <a:prstGeom prst="rect">
+            <a:avLst/>
+          </a:prstGeom>
+        </p:spPr>
+        <p:txBody>
+          <a:bodyPr vert="horz" lIns="91440" tIns="45720" rIns="91440" bIns="45720" rtlCol="0"/>
+          <a:lstStyle/>
+          <a:p>
+            <a:pPr lvl="0"/>
+            <a:r>
+              <a:rPr lang="en-US" smtClean="0"/>
+              <a:t>Click to edit Master text styles</a:t>
+            </a:r>
+          </a:p>
+          <a:p>
+            <a:pPr lvl="1"/>
+            <a:r>
+              <a:rPr lang="en-US" smtClean="0"/>
+              <a:t>Second level</a:t>
+            </a:r>
+          </a:p>
+          <a:p>
+            <a:pPr lvl="2"/>
+            <a:r>
+              <a:rPr lang="en-US" smtClean="0"/>
+              <a:t>Third level</a:t>
+            </a:r>
+          </a:p>
+          <a:p>
+            <a:pPr lvl="3"/>
+            <a:r>
+              <a:rPr lang="en-US" smtClean="0"/>
+              <a:t>Fourth level</a:t>
+            </a:r>
+          </a:p>
+          <a:p>
+            <a:pPr lvl="4"/>
+            <a:r>
+              <a:rPr lang="en-US" smtClean="0"/>
+              <a:t>Fifth level</a:t>
+            </a:r>
+            <a:endParaRPr lang="en-US"/>
+          </a:p>
+        </p:txBody>
+      </p:sp>
+      <p:sp>
+        <p:nvSpPr>
+          <p:cNvPr id="6" name="Footer Placeholder 5"/>
+          <p:cNvSpPr>
+            <a:spLocks noGrp="1"/>
+          </p:cNvSpPr>
+          <p:nvPr>
+            <p:ph type="ftr" sz="quarter" idx="4"/>
+          </p:nvPr>
+        </p:nvSpPr>
+        <p:spPr>
+          <a:xfrm>
+            <a:off x="0" y="8685213"/>
+            <a:ext cx="2971800" cy="458787"/>
+          </a:xfrm>
+          <a:prstGeom prst="rect">
+            <a:avLst/>
+          </a:prstGeom>
+        </p:spPr>
+        <p:txBody>
+          <a:bodyPr vert="horz" lIns="91440" tIns="45720" rIns="91440" bIns="45720" rtlCol="0" anchor="b"/>
+          <a:lstStyle>
+            <a:lvl1pPr algn="l">
+              <a:defRPr sz="1200"/>
+            </a:lvl1pPr>
+          </a:lstStyle>
+          <a:p>
+            <a:endParaRPr lang="en-US"/>
+          </a:p>
+        </p:txBody>
+      </p:sp>
+      <p:sp>
+        <p:nvSpPr>
+          <p:cNvPr id="7" name="Slide Number Placeholder 6"/>
+          <p:cNvSpPr>
+            <a:spLocks noGrp="1"/>
+          </p:cNvSpPr>
+          <p:nvPr>
+            <p:ph type="sldNum" sz="quarter" idx="5"/>
+          </p:nvPr>
+        </p:nvSpPr>
+        <p:spPr>
+          <a:xfrm>
+            <a:off x="3884613" y="8685213"/>
+            <a:ext cx="2971800" cy="458787"/>
+          </a:xfrm>
+          <a:prstGeom prst="rect">
+            <a:avLst/>
+          </a:prstGeom>
+        </p:spPr>
+        <p:txBody>
+          <a:bodyPr vert="horz" lIns="91440" tIns="45720" rIns="91440" bIns="45720" rtlCol="0" anchor="b"/>
+          <a:lstStyle>
+            <a:lvl1pPr algn="r">
+              <a:defRPr sz="1200"/>
+            </a:lvl1pPr>
+          </a:lstStyle>
+          <a:p>
+            <a:fld id="{FC1CB794-A71E-F442-B9AD-B71BA6D44B5B}" type="slidenum">
+              <a:rPr lang="en-US" smtClean="0"/>
+              <a:t>‹#›</a:t>
+            </a:fld>
+            <a:endParaRPr lang="en-US"/>
+          </a:p>
+        </p:txBody>
+      </p:sp>
+    </p:spTree>
+    <p:extLst>
+      <p:ext uri="{BB962C8B-B14F-4D97-AF65-F5344CB8AC3E}">
+        <p14:creationId xmlns:p14="http://schemas.microsoft.com/office/powerpoint/2010/main" val="987996544"/>
+      </p:ext>
+    </p:extLst>
+  </p:cSld>
+  <p:clrMap bg1="lt1" tx1="dk1" bg2="lt2" tx2="dk2" accent1="accent1" accent2="accent2" accent3="accent3" accent4="accent4" accent5="accent5" accent6="accent6" hlink="hlink" folHlink="folHlink"/>
+  <p:notesStyle>
+    <a:lvl1pPr marL="0" algn="l" defTabSz="914400" rtl="0" eaLnBrk="1" latinLnBrk="0" hangingPunct="1">
+      <a:defRPr sz="1200" kern="1200">
+        <a:solidFill>
+          <a:schemeClr val="tx1"/>
+        </a:solidFill>
+        <a:latin typeface="+mn-lt"/>
+        <a:ea typeface="+mn-ea"/>
+        <a:cs typeface="+mn-cs"/>
+      </a:defRPr>
+    </a:lvl1pPr>
+    <a:lvl2pPr marL="457200" algn="l" defTabSz="914400" rtl="0" eaLnBrk="1" latinLnBrk="0" hangingPunct="1">
+      <a:defRPr sz="1200" kern="1200">
+        <a:solidFill>
+          <a:schemeClr val="tx1"/>
+        </a:solidFill>
+        <a:latin typeface="+mn-lt"/>
+        <a:ea typeface="+mn-ea"/>
+        <a:cs typeface="+mn-cs"/>
+      </a:defRPr>
+    </a:lvl2pPr>
+    <a:lvl3pPr marL="914400" algn="l" defTabSz="914400" rtl="0" eaLnBrk="1" latinLnBrk="0" hangingPunct="1">
+      <a:defRPr sz="1200" kern="1200">
+        <a:solidFill>
+          <a:schemeClr val="tx1"/>
+        </a:solidFill>
+        <a:latin typeface="+mn-lt"/>
+        <a:ea typeface="+mn-ea"/>
+        <a:cs typeface="+mn-cs"/>
+      </a:defRPr>
+    </a:lvl3pPr>
+    <a:lvl4pPr marL="1371600" algn="l" defTabSz="914400" rtl="0" eaLnBrk="1" latinLnBrk="0" hangingPunct="1">
+      <a:defRPr sz="1200" kern="1200">
+        <a:solidFill>
+          <a:schemeClr val="tx1"/>
+        </a:solidFill>
+        <a:latin typeface="+mn-lt"/>
+        <a:ea typeface="+mn-ea"/>
+        <a:cs typeface="+mn-cs"/>
+      </a:defRPr>
+    </a:lvl4pPr>
+    <a:lvl5pPr marL="1828800" algn="l" defTabSz="914400" rtl="0" eaLnBrk="1" latinLnBrk="0" hangingPunct="1">
+      <a:defRPr sz="1200" kern="1200">
+        <a:solidFill>
+          <a:schemeClr val="tx1"/>
+        </a:solidFill>
+        <a:latin typeface="+mn-lt"/>
+        <a:ea typeface="+mn-ea"/>
+        <a:cs typeface="+mn-cs"/>
+      </a:defRPr>
+    </a:lvl5pPr>
+    <a:lvl6pPr marL="2286000" algn="l" defTabSz="914400" rtl="0" eaLnBrk="1" latinLnBrk="0" hangingPunct="1">
+      <a:defRPr sz="1200" kern="1200">
+        <a:solidFill>
+          <a:schemeClr val="tx1"/>
+        </a:solidFill>
+        <a:latin typeface="+mn-lt"/>
+        <a:ea typeface="+mn-ea"/>
+        <a:cs typeface="+mn-cs"/>
+      </a:defRPr>
+    </a:lvl6pPr>
+    <a:lvl7pPr marL="2743200" algn="l" defTabSz="914400" rtl="0" eaLnBrk="1" latinLnBrk="0" hangingPunct="1">
+      <a:defRPr sz="1200" kern="1200">
+        <a:solidFill>
+          <a:schemeClr val="tx1"/>
+        </a:solidFill>
+        <a:latin typeface="+mn-lt"/>
+        <a:ea typeface="+mn-ea"/>
+        <a:cs typeface="+mn-cs"/>
+      </a:defRPr>
+    </a:lvl7pPr>
+    <a:lvl8pPr marL="3200400" algn="l" defTabSz="914400" rtl="0" eaLnBrk="1" latinLnBrk="0" hangingPunct="1">
+      <a:defRPr sz="1200" kern="1200">
+        <a:solidFill>
+          <a:schemeClr val="tx1"/>
+        </a:solidFill>
+        <a:latin typeface="+mn-lt"/>
+        <a:ea typeface="+mn-ea"/>
+        <a:cs typeface="+mn-cs"/>
+      </a:defRPr>
+    </a:lvl8pPr>
+    <a:lvl9pPr marL="3657600" algn="l" defTabSz="914400" rtl="0" eaLnBrk="1" latinLnBrk="0" hangingPunct="1">
+      <a:defRPr sz="1200" kern="1200">
+        <a:solidFill>
+          <a:schemeClr val="tx1"/>
+        </a:solidFill>
+        <a:latin typeface="+mn-lt"/>
+        <a:ea typeface="+mn-ea"/>
+        <a:cs typeface="+mn-cs"/>
+      </a:defRPr>
+    </a:lvl9pPr>
+  </p:notesStyle>
+</p:notesMaster>
 </file>
 
 <file path=ppt/slideLayouts/slideLayout1.xml><?xml version="1.0" encoding="utf-8"?>
@@ -2973,31 +3326,31 @@
           <p:nvPr>
             <p:extLst>
               <p:ext uri="{D42A27DB-BD31-4B8C-83A1-F6EECF244321}">
-                <p14:modId xmlns:p14="http://schemas.microsoft.com/office/powerpoint/2010/main" val="1670493231"/>
+                <p14:modId xmlns:p14="http://schemas.microsoft.com/office/powerpoint/2010/main" val="1363526245"/>
               </p:ext>
             </p:extLst>
           </p:nvPr>
         </p:nvGraphicFramePr>
         <p:xfrm>
-          <a:off x="2493490" y="405114"/>
-          <a:ext cx="7024221" cy="4108097"/>
+          <a:off x="1326777" y="512691"/>
+          <a:ext cx="8749552" cy="4366798"/>
         </p:xfrm>
         <a:graphic>
           <a:graphicData uri="http://schemas.openxmlformats.org/drawingml/2006/table">
             <a:tbl>
               <a:tblPr/>
               <a:tblGrid>
-                <a:gridCol w="952610"/>
-                <a:gridCol w="6071611"/>
+                <a:gridCol w="1219199"/>
+                <a:gridCol w="7530353"/>
               </a:tblGrid>
-              <a:tr h="847547">
+              <a:tr h="777240">
                 <a:tc>
                   <a:txBody>
                     <a:bodyPr/>
                     <a:lstStyle/>
                     <a:p>
                       <a:r>
-                        <a:rPr lang="en-US" sz="1000" dirty="0">
+                        <a:rPr lang="en-US" sz="1300" dirty="0">
                           <a:solidFill>
                             <a:schemeClr val="bg1"/>
                           </a:solidFill>
@@ -3007,7 +3360,7 @@
                       </a:r>
                     </a:p>
                   </a:txBody>
-                  <a:tcPr marL="82287" marR="82287" marT="82287" marB="82287" anchor="ctr">
+                  <a:tcPr marL="82287" marR="82287" marT="0" marB="0" anchor="ctr">
                     <a:lnL w="12700" cap="flat" cmpd="sng" algn="ctr">
                       <a:solidFill>
                         <a:srgbClr val="8D8A8A"/>
@@ -3055,25 +3408,25 @@
                     <a:lstStyle/>
                     <a:p>
                       <a:r>
-                        <a:rPr lang="en-US" sz="1000" dirty="0" smtClean="0">
+                        <a:rPr lang="en-US" sz="1300" dirty="0" smtClean="0">
                           <a:solidFill>
                             <a:schemeClr val="bg1"/>
                           </a:solidFill>
                           <a:effectLst/>
                         </a:rPr>
-                        <a:t>This unit begins by exploring </a:t>
+                        <a:t>Students first explore the </a:t>
                       </a:r>
                       <a:r>
-                        <a:rPr lang="en-US" sz="1000" dirty="0">
+                        <a:rPr lang="en-US" sz="1300" dirty="0">
                           <a:solidFill>
                             <a:schemeClr val="bg1"/>
                           </a:solidFill>
                           <a:effectLst/>
                         </a:rPr>
-                        <a:t>the technical challenges and questions that arise from the need to represent digital information in computers and transfer it between people and computational devices. </a:t>
+                        <a:t>technical challenges and questions that arise from the need to represent digital information in computers and transfer it between people and computational devices. </a:t>
                       </a:r>
                       <a:r>
-                        <a:rPr lang="en-US" sz="1000" dirty="0" smtClean="0">
+                        <a:rPr lang="en-US" sz="1300" dirty="0" smtClean="0">
                           <a:solidFill>
                             <a:schemeClr val="bg1"/>
                           </a:solidFill>
@@ -3082,7 +3435,7 @@
                         <a:t>In</a:t>
                       </a:r>
                       <a:r>
-                        <a:rPr lang="en-US" sz="1000" baseline="0" dirty="0" smtClean="0">
+                        <a:rPr lang="en-US" sz="1300" baseline="0" dirty="0" smtClean="0">
                           <a:solidFill>
                             <a:schemeClr val="bg1"/>
                           </a:solidFill>
@@ -3091,7 +3444,7 @@
                         <a:t> the second half of the unit, students </a:t>
                       </a:r>
                       <a:r>
-                        <a:rPr lang="en-US" sz="1000" dirty="0" smtClean="0">
+                        <a:rPr lang="en-US" sz="1300" dirty="0" smtClean="0">
                           <a:solidFill>
                             <a:schemeClr val="bg1"/>
                           </a:solidFill>
@@ -3100,7 +3453,7 @@
                         <a:t>solve </a:t>
                       </a:r>
                       <a:r>
-                        <a:rPr lang="en-US" sz="1000" dirty="0">
+                        <a:rPr lang="en-US" sz="1300" dirty="0">
                           <a:solidFill>
                             <a:schemeClr val="bg1"/>
                           </a:solidFill>
@@ -3110,7 +3463,7 @@
                       </a:r>
                     </a:p>
                   </a:txBody>
-                  <a:tcPr marL="82287" marR="82287" marT="82287" marB="82287" anchor="ctr">
+                  <a:tcPr marL="82287" marR="82287" marT="0" marB="0" anchor="ctr">
                     <a:lnL w="12700" cap="flat" cmpd="sng" algn="ctr">
                       <a:solidFill>
                         <a:srgbClr val="8D8A8A"/>
@@ -3153,14 +3506,14 @@
                   </a:tcPr>
                 </a:tc>
               </a:tr>
-              <a:tr h="757041">
+              <a:tr h="777240">
                 <a:tc>
                   <a:txBody>
                     <a:bodyPr/>
                     <a:lstStyle/>
                     <a:p>
                       <a:r>
-                        <a:rPr lang="en-US" sz="1000">
+                        <a:rPr lang="en-US" sz="1300" dirty="0">
                           <a:solidFill>
                             <a:schemeClr val="bg1"/>
                           </a:solidFill>
@@ -3170,7 +3523,7 @@
                       </a:r>
                     </a:p>
                   </a:txBody>
-                  <a:tcPr marL="82287" marR="82287" marT="82287" marB="82287" anchor="ctr">
+                  <a:tcPr marL="82287" marR="82287" marT="0" marB="0" anchor="ctr">
                     <a:lnL w="12700" cap="flat" cmpd="sng" algn="ctr">
                       <a:solidFill>
                         <a:srgbClr val="8D8A8A"/>
@@ -3218,34 +3571,34 @@
                     <a:lstStyle/>
                     <a:p>
                       <a:r>
-                        <a:rPr lang="en-US" sz="1000" dirty="0" smtClean="0">
+                        <a:rPr lang="en-US" sz="1300" dirty="0" smtClean="0">
                           <a:solidFill>
                             <a:schemeClr val="bg1"/>
                           </a:solidFill>
                           <a:effectLst/>
                         </a:rPr>
-                        <a:t>This unit further explores </a:t>
+                        <a:t>Students further explore the ways </a:t>
                       </a:r>
                       <a:r>
-                        <a:rPr lang="en-US" sz="1000" dirty="0">
+                        <a:rPr lang="en-US" sz="1300" dirty="0">
                           <a:solidFill>
                             <a:schemeClr val="bg1"/>
                           </a:solidFill>
                           <a:effectLst/>
                         </a:rPr>
-                        <a:t>the ways that digital information is encoded, represented and manipulated. </a:t>
+                        <a:t>digital information is encoded, represented and manipulated. </a:t>
                       </a:r>
                       <a:r>
-                        <a:rPr lang="en-US" sz="1000" dirty="0" smtClean="0">
+                        <a:rPr lang="en-US" sz="1300" dirty="0" smtClean="0">
                           <a:solidFill>
                             <a:schemeClr val="bg1"/>
                           </a:solidFill>
                           <a:effectLst/>
                         </a:rPr>
-                        <a:t>Students will look </a:t>
+                        <a:t>They look </a:t>
                       </a:r>
                       <a:r>
-                        <a:rPr lang="en-US" sz="1000" dirty="0">
+                        <a:rPr lang="en-US" sz="1300" dirty="0">
                           <a:solidFill>
                             <a:schemeClr val="bg1"/>
                           </a:solidFill>
@@ -3255,7 +3608,7 @@
                       </a:r>
                     </a:p>
                   </a:txBody>
-                  <a:tcPr marL="82287" marR="82287" marT="82287" marB="82287" anchor="ctr">
+                  <a:tcPr marL="82287" marR="82287" marT="0" marB="0" anchor="ctr">
                     <a:lnL w="12700" cap="flat" cmpd="sng" algn="ctr">
                       <a:solidFill>
                         <a:srgbClr val="8D8A8A"/>
@@ -3298,14 +3651,14 @@
                   </a:tcPr>
                 </a:tc>
               </a:tr>
-              <a:tr h="638547">
+              <a:tr h="777240">
                 <a:tc>
                   <a:txBody>
                     <a:bodyPr/>
                     <a:lstStyle/>
                     <a:p>
                       <a:r>
-                        <a:rPr lang="en-US" sz="1000">
+                        <a:rPr lang="en-US" sz="1300" dirty="0">
                           <a:solidFill>
                             <a:schemeClr val="bg1"/>
                           </a:solidFill>
@@ -3315,7 +3668,7 @@
                       </a:r>
                     </a:p>
                   </a:txBody>
-                  <a:tcPr marL="82287" marR="82287" marT="82287" marB="82287" anchor="ctr">
+                  <a:tcPr marL="82287" marR="82287" marT="0" marB="0" anchor="ctr">
                     <a:lnL w="12700" cap="flat" cmpd="sng" algn="ctr">
                       <a:solidFill>
                         <a:srgbClr val="8D8A8A"/>
@@ -3363,16 +3716,16 @@
                     <a:lstStyle/>
                     <a:p>
                       <a:r>
-                        <a:rPr lang="en-US" sz="1000" dirty="0" smtClean="0">
+                        <a:rPr lang="en-US" sz="1300" dirty="0" smtClean="0">
                           <a:solidFill>
                             <a:schemeClr val="bg1"/>
                           </a:solidFill>
                           <a:effectLst/>
                         </a:rPr>
-                        <a:t>This unit introduces students to programming in the JavaScript language and create small applications (apps) that live on the web. </a:t>
+                        <a:t>Students are introduced to programming in the JavaScript language and create small applications (apps) that live on the web. </a:t>
                       </a:r>
                       <a:r>
-                        <a:rPr lang="en-US" sz="1000" baseline="0" dirty="0" smtClean="0">
+                        <a:rPr lang="en-US" sz="1300" baseline="0" dirty="0" smtClean="0">
                           <a:solidFill>
                             <a:schemeClr val="bg1"/>
                           </a:solidFill>
@@ -3381,7 +3734,7 @@
                         <a:t> There is heavy emphasis on </a:t>
                       </a:r>
                       <a:r>
-                        <a:rPr lang="en-US" sz="1000" dirty="0" smtClean="0">
+                        <a:rPr lang="en-US" sz="1300" dirty="0" smtClean="0">
                           <a:solidFill>
                             <a:schemeClr val="bg1"/>
                           </a:solidFill>
@@ -3390,7 +3743,7 @@
                         <a:t>understanding </a:t>
                       </a:r>
                       <a:r>
-                        <a:rPr lang="en-US" sz="1000" dirty="0">
+                        <a:rPr lang="en-US" sz="1300" dirty="0">
                           <a:solidFill>
                             <a:schemeClr val="bg1"/>
                           </a:solidFill>
@@ -3400,7 +3753,7 @@
                       </a:r>
                     </a:p>
                   </a:txBody>
-                  <a:tcPr marL="82287" marR="82287" marT="82287" marB="82287" anchor="ctr">
+                  <a:tcPr marL="82287" marR="82287" marT="0" marB="0" anchor="ctr">
                     <a:lnL w="12700" cap="flat" cmpd="sng" algn="ctr">
                       <a:solidFill>
                         <a:srgbClr val="8D8A8A"/>
@@ -3443,14 +3796,14 @@
                   </a:tcPr>
                 </a:tc>
               </a:tr>
-              <a:tr h="638547">
+              <a:tr h="777240">
                 <a:tc>
                   <a:txBody>
                     <a:bodyPr/>
                     <a:lstStyle/>
                     <a:p>
                       <a:r>
-                        <a:rPr lang="en-US" sz="1000">
+                        <a:rPr lang="en-US" sz="1300">
                           <a:solidFill>
                             <a:schemeClr val="bg1"/>
                           </a:solidFill>
@@ -3460,7 +3813,7 @@
                       </a:r>
                     </a:p>
                   </a:txBody>
-                  <a:tcPr marL="82287" marR="82287" marT="82287" marB="82287" anchor="ctr">
+                  <a:tcPr marL="82287" marR="82287" marT="0" marB="0" anchor="ctr">
                     <a:lnL w="12700" cap="flat" cmpd="sng" algn="ctr">
                       <a:solidFill>
                         <a:srgbClr val="8D8A8A"/>
@@ -3508,16 +3861,16 @@
                     <a:lstStyle/>
                     <a:p>
                       <a:r>
-                        <a:rPr lang="en-US" sz="1000" dirty="0" smtClean="0">
+                        <a:rPr lang="en-US" sz="1300" dirty="0" smtClean="0">
                           <a:solidFill>
                             <a:schemeClr val="bg1"/>
                           </a:solidFill>
                           <a:effectLst/>
                         </a:rPr>
-                        <a:t>This unit helps students develop </a:t>
+                        <a:t>Students develop </a:t>
                       </a:r>
                       <a:r>
-                        <a:rPr lang="en-US" sz="1000" dirty="0">
+                        <a:rPr lang="en-US" sz="1300" dirty="0">
                           <a:solidFill>
                             <a:schemeClr val="bg1"/>
                           </a:solidFill>
@@ -3526,44 +3879,26 @@
                         <a:t>a well-rounded and balanced view about data in the world and its positive and negative effects. </a:t>
                       </a:r>
                       <a:r>
-                        <a:rPr lang="en-US" sz="1000" dirty="0" smtClean="0">
+                        <a:rPr lang="en-US" sz="1300" dirty="0" smtClean="0">
                           <a:solidFill>
                             <a:schemeClr val="bg1"/>
                           </a:solidFill>
                           <a:effectLst/>
                         </a:rPr>
-                        <a:t> It</a:t>
+                        <a:t> They learn the </a:t>
                       </a:r>
                       <a:r>
-                        <a:rPr lang="en-US" sz="1000" baseline="0" dirty="0" smtClean="0">
+                        <a:rPr lang="en-US" sz="1300" dirty="0">
                           <a:solidFill>
                             <a:schemeClr val="bg1"/>
                           </a:solidFill>
                           <a:effectLst/>
                         </a:rPr>
-                        <a:t> will also help them understand</a:t>
-                      </a:r>
-                      <a:r>
-                        <a:rPr lang="en-US" sz="1000" dirty="0" smtClean="0">
-                          <a:solidFill>
-                            <a:schemeClr val="bg1"/>
-                          </a:solidFill>
-                          <a:effectLst/>
-                        </a:rPr>
-                        <a:t> </a:t>
-                      </a:r>
-                      <a:r>
-                        <a:rPr lang="en-US" sz="1000" dirty="0">
-                          <a:solidFill>
-                            <a:schemeClr val="bg1"/>
-                          </a:solidFill>
-                          <a:effectLst/>
-                        </a:rPr>
-                        <a:t>the basics of how and why modern encryption works.</a:t>
+                        <a:t>basics of how and why modern encryption works.</a:t>
                       </a:r>
                     </a:p>
                   </a:txBody>
-                  <a:tcPr marL="82287" marR="82287" marT="82287" marB="82287" anchor="ctr">
+                  <a:tcPr marL="82287" marR="82287" marT="0" marB="0" anchor="ctr">
                     <a:lnL w="12700" cap="flat" cmpd="sng" algn="ctr">
                       <a:solidFill>
                         <a:srgbClr val="8D8A8A"/>
@@ -3606,14 +3941,14 @@
                   </a:tcPr>
                 </a:tc>
               </a:tr>
-              <a:tr h="757041">
+              <a:tr h="777240">
                 <a:tc>
                   <a:txBody>
                     <a:bodyPr/>
                     <a:lstStyle/>
                     <a:p>
                       <a:r>
-                        <a:rPr lang="en-US" sz="1000">
+                        <a:rPr lang="en-US" sz="1300" dirty="0">
                           <a:solidFill>
                             <a:schemeClr val="bg1"/>
                           </a:solidFill>
@@ -3623,7 +3958,7 @@
                       </a:r>
                     </a:p>
                   </a:txBody>
-                  <a:tcPr marL="82287" marR="82287" marT="82287" marB="82287" anchor="ctr">
+                  <a:tcPr marL="82287" marR="82287" marT="0" marB="0" anchor="ctr">
                     <a:lnL w="12700" cap="flat" cmpd="sng" algn="ctr">
                       <a:solidFill>
                         <a:srgbClr val="8D8A8A"/>
@@ -3671,34 +4006,70 @@
                     <a:lstStyle/>
                     <a:p>
                       <a:r>
-                        <a:rPr lang="en-US" sz="1000" dirty="0" smtClean="0">
+                        <a:rPr lang="en-US" sz="1300" dirty="0" smtClean="0">
                           <a:solidFill>
                             <a:schemeClr val="bg1"/>
                           </a:solidFill>
                           <a:effectLst/>
                         </a:rPr>
-                        <a:t>This unit continues to develop students’ ability </a:t>
+                        <a:t>Students continue to develop their programming ability </a:t>
                       </a:r>
                       <a:r>
-                        <a:rPr lang="en-US" sz="1000" dirty="0">
+                        <a:rPr lang="en-US" sz="1300" dirty="0">
                           <a:solidFill>
                             <a:schemeClr val="bg1"/>
                           </a:solidFill>
                           <a:effectLst/>
                         </a:rPr>
-                        <a:t>to program in the JavaScript language to create a series of small applications (apps) that live on the web, each highlighting a core concept of programming. </a:t>
+                        <a:t>in the JavaScript </a:t>
                       </a:r>
                       <a:r>
-                        <a:rPr lang="en-US" sz="1000" dirty="0" smtClean="0">
+                        <a:rPr lang="en-US" sz="1300" dirty="0" smtClean="0">
                           <a:solidFill>
                             <a:schemeClr val="bg1"/>
                           </a:solidFill>
                           <a:effectLst/>
                         </a:rPr>
-                        <a:t>Students will transition </a:t>
+                        <a:t>language.</a:t>
                       </a:r>
                       <a:r>
-                        <a:rPr lang="en-US" sz="1000" dirty="0">
+                        <a:rPr lang="en-US" sz="1300" baseline="0" dirty="0" smtClean="0">
+                          <a:solidFill>
+                            <a:schemeClr val="bg1"/>
+                          </a:solidFill>
+                          <a:effectLst/>
+                        </a:rPr>
+                        <a:t>  They </a:t>
+                      </a:r>
+                      <a:r>
+                        <a:rPr lang="en-US" sz="1300" dirty="0" smtClean="0">
+                          <a:solidFill>
+                            <a:schemeClr val="bg1"/>
+                          </a:solidFill>
+                          <a:effectLst/>
+                        </a:rPr>
+                        <a:t>create </a:t>
+                      </a:r>
+                      <a:r>
+                        <a:rPr lang="en-US" sz="1300" dirty="0">
+                          <a:solidFill>
+                            <a:schemeClr val="bg1"/>
+                          </a:solidFill>
+                          <a:effectLst/>
+                        </a:rPr>
+                        <a:t>a series of small applications (apps) that live on the web, each highlighting a core concept of programming. </a:t>
+                      </a:r>
+                      <a:r>
+                        <a:rPr lang="en-US" sz="1300" dirty="0" smtClean="0">
+                          <a:solidFill>
+                            <a:schemeClr val="bg1"/>
+                          </a:solidFill>
+                          <a:effectLst/>
+                        </a:rPr>
+                        <a:t>Students transition </a:t>
+                      </a:r>
+                      <a:r>
+                        <a:rPr lang="en-US" sz="1300" dirty="0">
                           <a:solidFill>
                             <a:schemeClr val="bg1"/>
                           </a:solidFill>
@@ -3708,7 +4079,7 @@
                       </a:r>
                     </a:p>
                   </a:txBody>
-                  <a:tcPr marL="82287" marR="82287" marT="82287" marB="82287" anchor="ctr">
+                  <a:tcPr marL="82287" marR="82287" marT="0" marB="0" anchor="ctr">
                     <a:lnL w="12700" cap="flat" cmpd="sng" algn="ctr">
                       <a:solidFill>
                         <a:srgbClr val="8D8A8A"/>
@@ -3751,14 +4122,14 @@
                   </a:tcPr>
                 </a:tc>
               </a:tr>
-              <a:tr h="401561">
+              <a:tr h="480598">
                 <a:tc>
                   <a:txBody>
                     <a:bodyPr/>
                     <a:lstStyle/>
                     <a:p>
                       <a:r>
-                        <a:rPr lang="en-US" sz="1000" dirty="0">
+                        <a:rPr lang="en-US" sz="1300" dirty="0">
                           <a:solidFill>
                             <a:schemeClr val="bg1"/>
                           </a:solidFill>
@@ -3768,7 +4139,7 @@
                       </a:r>
                     </a:p>
                   </a:txBody>
-                  <a:tcPr marL="82287" marR="82287" marT="82287" marB="82287" anchor="ctr">
+                  <a:tcPr marL="82287" marR="82287" marT="0" marB="0" anchor="ctr">
                     <a:lnL w="12700" cap="flat" cmpd="sng" algn="ctr">
                       <a:solidFill>
                         <a:srgbClr val="8D8A8A"/>
@@ -3816,7 +4187,7 @@
                     <a:lstStyle/>
                     <a:p>
                       <a:r>
-                        <a:rPr lang="en-US" sz="1000" dirty="0" smtClean="0">
+                        <a:rPr lang="en-US" sz="1300" dirty="0" smtClean="0">
                           <a:solidFill>
                             <a:schemeClr val="bg1"/>
                           </a:solidFill>
@@ -3825,7 +4196,7 @@
                         <a:t>Class time devoted to preparation </a:t>
                       </a:r>
                       <a:r>
-                        <a:rPr lang="en-US" sz="1000" dirty="0">
+                        <a:rPr lang="en-US" sz="1300" dirty="0">
                           <a:solidFill>
                             <a:schemeClr val="bg1"/>
                           </a:solidFill>
@@ -3834,7 +4205,7 @@
                         <a:t>and </a:t>
                       </a:r>
                       <a:r>
-                        <a:rPr lang="en-US" sz="1000" dirty="0" smtClean="0">
+                        <a:rPr lang="en-US" sz="1300" dirty="0" smtClean="0">
                           <a:solidFill>
                             <a:schemeClr val="bg1"/>
                           </a:solidFill>
@@ -3843,7 +4214,7 @@
                         <a:t>execution</a:t>
                       </a:r>
                       <a:r>
-                        <a:rPr lang="en-US" sz="1000" baseline="0" dirty="0" smtClean="0">
+                        <a:rPr lang="en-US" sz="1300" baseline="0" dirty="0" smtClean="0">
                           <a:solidFill>
                             <a:schemeClr val="bg1"/>
                           </a:solidFill>
@@ -3852,7 +4223,7 @@
                         <a:t> of</a:t>
                       </a:r>
                       <a:r>
-                        <a:rPr lang="en-US" sz="1000" dirty="0" smtClean="0">
+                        <a:rPr lang="en-US" sz="1300" dirty="0" smtClean="0">
                           <a:solidFill>
                             <a:schemeClr val="bg1"/>
                           </a:solidFill>
@@ -3861,7 +4232,7 @@
                         <a:t> </a:t>
                       </a:r>
                       <a:r>
-                        <a:rPr lang="en-US" sz="1000" dirty="0">
+                        <a:rPr lang="en-US" sz="1300" dirty="0">
                           <a:solidFill>
                             <a:schemeClr val="bg1"/>
                           </a:solidFill>
@@ -3871,7 +4242,7 @@
                       </a:r>
                     </a:p>
                   </a:txBody>
-                  <a:tcPr marL="82287" marR="82287" marT="82287" marB="82287" anchor="ctr">
+                  <a:tcPr marL="82287" marR="82287" marT="0" marB="0" anchor="ctr">
                     <a:lnL w="12700" cap="flat" cmpd="sng" algn="ctr">
                       <a:solidFill>
                         <a:srgbClr val="8D8A8A"/>
@@ -3921,7 +4292,7 @@
     </p:spTree>
     <p:extLst>
       <p:ext uri="{BB962C8B-B14F-4D97-AF65-F5344CB8AC3E}">
-        <p14:creationId xmlns:p14="http://schemas.microsoft.com/office/powerpoint/2010/main" val="1088310929"/>
+        <p14:creationId xmlns:p14="http://schemas.microsoft.com/office/powerpoint/2010/main" val="1226762015"/>
       </p:ext>
     </p:extLst>
   </p:cSld>
@@ -4190,4 +4561,265 @@
     </a:ext>
   </a:extLst>
 </a:theme>
+</file>
+
+<file path=ppt/theme/theme2.xml><?xml version="1.0" encoding="utf-8"?>
+<a:theme xmlns:a="http://schemas.openxmlformats.org/drawingml/2006/main" name="Office Theme">
+  <a:themeElements>
+    <a:clrScheme name="Office">
+      <a:dk1>
+        <a:sysClr val="windowText" lastClr="000000"/>
+      </a:dk1>
+      <a:lt1>
+        <a:sysClr val="window" lastClr="FFFFFF"/>
+      </a:lt1>
+      <a:dk2>
+        <a:srgbClr val="44546A"/>
+      </a:dk2>
+      <a:lt2>
+        <a:srgbClr val="E7E6E6"/>
+      </a:lt2>
+      <a:accent1>
+        <a:srgbClr val="5B9BD5"/>
+      </a:accent1>
+      <a:accent2>
+        <a:srgbClr val="ED7D31"/>
+      </a:accent2>
+      <a:accent3>
+        <a:srgbClr val="A5A5A5"/>
+      </a:accent3>
+      <a:accent4>
+        <a:srgbClr val="FFC000"/>
+      </a:accent4>
+      <a:accent5>
+        <a:srgbClr val="4472C4"/>
+      </a:accent5>
+      <a:accent6>
+        <a:srgbClr val="70AD47"/>
+      </a:accent6>
+      <a:hlink>
+        <a:srgbClr val="0563C1"/>
+      </a:hlink>
+      <a:folHlink>
+        <a:srgbClr val="954F72"/>
+      </a:folHlink>
+    </a:clrScheme>
+    <a:fontScheme name="Office">
+      <a:majorFont>
+        <a:latin typeface="Calibri Light" panose="020F0302020204030204"/>
+        <a:ea typeface=""/>
+        <a:cs typeface=""/>
+        <a:font script="Jpan" typeface="Yu Gothic Light"/>
+        <a:font script="Hang" typeface="맑은 고딕"/>
+        <a:font script="Hans" typeface="DengXian Light"/>
+        <a:font script="Hant" typeface="新細明體"/>
+        <a:font script="Arab" typeface="Times New Roman"/>
+        <a:font script="Hebr" typeface="Times New Roman"/>
+        <a:font script="Thai" typeface="Angsana New"/>
+        <a:font script="Ethi" typeface="Nyala"/>
+        <a:font script="Beng" typeface="Vrinda"/>
+        <a:font script="Gujr" typeface="Shruti"/>
+        <a:font script="Khmr" typeface="MoolBoran"/>
+        <a:font script="Knda" typeface="Tunga"/>
+        <a:font script="Guru" typeface="Raavi"/>
+        <a:font script="Cans" typeface="Euphemia"/>
+        <a:font script="Cher" typeface="Plantagenet Cherokee"/>
+        <a:font script="Yiii" typeface="Microsoft Yi Baiti"/>
+        <a:font script="Tibt" typeface="Microsoft Himalaya"/>
+        <a:font script="Thaa" typeface="MV Boli"/>
+        <a:font script="Deva" typeface="Mangal"/>
+        <a:font script="Telu" typeface="Gautami"/>
+        <a:font script="Taml" typeface="Latha"/>
+        <a:font script="Syrc" typeface="Estrangelo Edessa"/>
+        <a:font script="Orya" typeface="Kalinga"/>
+        <a:font script="Mlym" typeface="Kartika"/>
+        <a:font script="Laoo" typeface="DokChampa"/>
+        <a:font script="Sinh" typeface="Iskoola Pota"/>
+        <a:font script="Mong" typeface="Mongolian Baiti"/>
+        <a:font script="Viet" typeface="Times New Roman"/>
+        <a:font script="Uigh" typeface="Microsoft Uighur"/>
+        <a:font script="Geor" typeface="Sylfaen"/>
+      </a:majorFont>
+      <a:minorFont>
+        <a:latin typeface="Calibri" panose="020F0502020204030204"/>
+        <a:ea typeface=""/>
+        <a:cs typeface=""/>
+        <a:font script="Jpan" typeface="Yu Gothic"/>
+        <a:font script="Hang" typeface="맑은 고딕"/>
+        <a:font script="Hans" typeface="DengXian"/>
+        <a:font script="Hant" typeface="新細明體"/>
+        <a:font script="Arab" typeface="Arial"/>
+        <a:font script="Hebr" typeface="Arial"/>
+        <a:font script="Thai" typeface="Cordia New"/>
+        <a:font script="Ethi" typeface="Nyala"/>
+        <a:font script="Beng" typeface="Vrinda"/>
+        <a:font script="Gujr" typeface="Shruti"/>
+        <a:font script="Khmr" typeface="DaunPenh"/>
+        <a:font script="Knda" typeface="Tunga"/>
+        <a:font script="Guru" typeface="Raavi"/>
+        <a:font script="Cans" typeface="Euphemia"/>
+        <a:font script="Cher" typeface="Plantagenet Cherokee"/>
+        <a:font script="Yiii" typeface="Microsoft Yi Baiti"/>
+        <a:font script="Tibt" typeface="Microsoft Himalaya"/>
+        <a:font script="Thaa" typeface="MV Boli"/>
+        <a:font script="Deva" typeface="Mangal"/>
+        <a:font script="Telu" typeface="Gautami"/>
+        <a:font script="Taml" typeface="Latha"/>
+        <a:font script="Syrc" typeface="Estrangelo Edessa"/>
+        <a:font script="Orya" typeface="Kalinga"/>
+        <a:font script="Mlym" typeface="Kartika"/>
+        <a:font script="Laoo" typeface="DokChampa"/>
+        <a:font script="Sinh" typeface="Iskoola Pota"/>
+        <a:font script="Mong" typeface="Mongolian Baiti"/>
+        <a:font script="Viet" typeface="Arial"/>
+        <a:font script="Uigh" typeface="Microsoft Uighur"/>
+        <a:font script="Geor" typeface="Sylfaen"/>
+      </a:minorFont>
+    </a:fontScheme>
+    <a:fmtScheme name="Office">
+      <a:fillStyleLst>
+        <a:solidFill>
+          <a:schemeClr val="phClr"/>
+        </a:solidFill>
+        <a:gradFill rotWithShape="1">
+          <a:gsLst>
+            <a:gs pos="0">
+              <a:schemeClr val="phClr">
+                <a:lumMod val="110000"/>
+                <a:satMod val="105000"/>
+                <a:tint val="67000"/>
+              </a:schemeClr>
+            </a:gs>
+            <a:gs pos="50000">
+              <a:schemeClr val="phClr">
+                <a:lumMod val="105000"/>
+                <a:satMod val="103000"/>
+                <a:tint val="73000"/>
+              </a:schemeClr>
+            </a:gs>
+            <a:gs pos="100000">
+              <a:schemeClr val="phClr">
+                <a:lumMod val="105000"/>
+                <a:satMod val="109000"/>
+                <a:tint val="81000"/>
+              </a:schemeClr>
+            </a:gs>
+          </a:gsLst>
+          <a:lin ang="5400000" scaled="0"/>
+        </a:gradFill>
+        <a:gradFill rotWithShape="1">
+          <a:gsLst>
+            <a:gs pos="0">
+              <a:schemeClr val="phClr">
+                <a:satMod val="103000"/>
+                <a:lumMod val="102000"/>
+                <a:tint val="94000"/>
+              </a:schemeClr>
+            </a:gs>
+            <a:gs pos="50000">
+              <a:schemeClr val="phClr">
+                <a:satMod val="110000"/>
+                <a:lumMod val="100000"/>
+                <a:shade val="100000"/>
+              </a:schemeClr>
+            </a:gs>
+            <a:gs pos="100000">
+              <a:schemeClr val="phClr">
+                <a:lumMod val="99000"/>
+                <a:satMod val="120000"/>
+                <a:shade val="78000"/>
+              </a:schemeClr>
+            </a:gs>
+          </a:gsLst>
+          <a:lin ang="5400000" scaled="0"/>
+        </a:gradFill>
+      </a:fillStyleLst>
+      <a:lnStyleLst>
+        <a:ln w="6350" cap="flat" cmpd="sng" algn="ctr">
+          <a:solidFill>
+            <a:schemeClr val="phClr"/>
+          </a:solidFill>
+          <a:prstDash val="solid"/>
+          <a:miter lim="800000"/>
+        </a:ln>
+        <a:ln w="12700" cap="flat" cmpd="sng" algn="ctr">
+          <a:solidFill>
+            <a:schemeClr val="phClr"/>
+          </a:solidFill>
+          <a:prstDash val="solid"/>
+          <a:miter lim="800000"/>
+        </a:ln>
+        <a:ln w="19050" cap="flat" cmpd="sng" algn="ctr">
+          <a:solidFill>
+            <a:schemeClr val="phClr"/>
+          </a:solidFill>
+          <a:prstDash val="solid"/>
+          <a:miter lim="800000"/>
+        </a:ln>
+      </a:lnStyleLst>
+      <a:effectStyleLst>
+        <a:effectStyle>
+          <a:effectLst/>
+        </a:effectStyle>
+        <a:effectStyle>
+          <a:effectLst/>
+        </a:effectStyle>
+        <a:effectStyle>
+          <a:effectLst>
+            <a:outerShdw blurRad="57150" dist="19050" dir="5400000" algn="ctr" rotWithShape="0">
+              <a:srgbClr val="000000">
+                <a:alpha val="63000"/>
+              </a:srgbClr>
+            </a:outerShdw>
+          </a:effectLst>
+        </a:effectStyle>
+      </a:effectStyleLst>
+      <a:bgFillStyleLst>
+        <a:solidFill>
+          <a:schemeClr val="phClr"/>
+        </a:solidFill>
+        <a:solidFill>
+          <a:schemeClr val="phClr">
+            <a:tint val="95000"/>
+            <a:satMod val="170000"/>
+          </a:schemeClr>
+        </a:solidFill>
+        <a:gradFill rotWithShape="1">
+          <a:gsLst>
+            <a:gs pos="0">
+              <a:schemeClr val="phClr">
+                <a:tint val="93000"/>
+                <a:satMod val="150000"/>
+                <a:shade val="98000"/>
+                <a:lumMod val="102000"/>
+              </a:schemeClr>
+            </a:gs>
+            <a:gs pos="50000">
+              <a:schemeClr val="phClr">
+                <a:tint val="98000"/>
+                <a:satMod val="130000"/>
+                <a:shade val="90000"/>
+                <a:lumMod val="103000"/>
+              </a:schemeClr>
+            </a:gs>
+            <a:gs pos="100000">
+              <a:schemeClr val="phClr">
+                <a:shade val="63000"/>
+                <a:satMod val="120000"/>
+              </a:schemeClr>
+            </a:gs>
+          </a:gsLst>
+          <a:lin ang="5400000" scaled="0"/>
+        </a:gradFill>
+      </a:bgFillStyleLst>
+    </a:fmtScheme>
+  </a:themeElements>
+  <a:objectDefaults/>
+  <a:extraClrSchemeLst/>
+  <a:extLst>
+    <a:ext uri="{05A4C25C-085E-4340-85A3-A5531E510DB2}">
+      <thm15:themeFamily xmlns:thm15="http://schemas.microsoft.com/office/thememl/2012/main" name="Office Theme" id="{62F939B6-93AF-4DB8-9C6B-D6C7DFDC589F}" vid="{4A3C46E8-61CC-4603-A589-7422A47A8E4A}"/>
+    </a:ext>
+  </a:extLst>
+</a:theme>
 </file>
</xml_diff>